<commit_message>
Modification of picture for v2, expect PLE analysis
</commit_message>
<xml_diff>
--- a/04-CrMagOpt/Pictures/6peaks.pptx
+++ b/04-CrMagOpt/Pictures/6peaks.pptx
@@ -10,7 +10,7 @@
   <p:sldIdLst>
     <p:sldId id="256" r:id="rId2"/>
   </p:sldIdLst>
-  <p:sldSz cx="14941550" cy="6300788"/>
+  <p:sldSz cx="14941550" cy="7740650"/>
   <p:notesSz cx="6858000" cy="9144000"/>
   <p:defaultTextStyle>
     <a:defPPr>
@@ -192,7 +192,7 @@
           <a:p>
             <a:fld id="{71ADB72D-4157-40BD-BB8F-EC580E2842DA}" type="datetimeFigureOut">
               <a:rPr lang="fr-FR" smtClean="0"/>
-              <a:t>05/04/2017</a:t>
+              <a:t>25/04/2017</a:t>
             </a:fld>
             <a:endParaRPr lang="fr-FR"/>
           </a:p>
@@ -210,8 +210,8 @@
         </p:nvSpPr>
         <p:spPr>
           <a:xfrm>
-            <a:off x="-636588" y="685800"/>
-            <a:ext cx="8131176" cy="3429000"/>
+            <a:off x="120650" y="685800"/>
+            <a:ext cx="6616700" cy="3429000"/>
           </a:xfrm>
           <a:prstGeom prst="rect">
             <a:avLst/>
@@ -489,8 +489,8 @@
         </p:nvSpPr>
         <p:spPr>
           <a:xfrm>
-            <a:off x="-636588" y="685800"/>
-            <a:ext cx="8131176" cy="3429000"/>
+            <a:off x="120650" y="685800"/>
+            <a:ext cx="6616700" cy="3429000"/>
           </a:xfrm>
         </p:spPr>
       </p:sp>
@@ -578,8 +578,8 @@
         </p:nvSpPr>
         <p:spPr>
           <a:xfrm>
-            <a:off x="1120618" y="1957329"/>
-            <a:ext cx="12700315" cy="1350586"/>
+            <a:off x="1120622" y="2404621"/>
+            <a:ext cx="12700315" cy="1659223"/>
           </a:xfrm>
         </p:spPr>
         <p:txBody>
@@ -606,8 +606,8 @@
         </p:nvSpPr>
         <p:spPr>
           <a:xfrm>
-            <a:off x="2241240" y="3570447"/>
-            <a:ext cx="10459089" cy="1610202"/>
+            <a:off x="2241243" y="4386368"/>
+            <a:ext cx="10459089" cy="1978167"/>
           </a:xfrm>
         </p:spPr>
         <p:txBody>
@@ -730,7 +730,7 @@
           <a:p>
             <a:fld id="{95A67E3B-D062-4AFC-ACCE-50FD5F000C57}" type="datetimeFigureOut">
               <a:rPr lang="fr-FR" smtClean="0"/>
-              <a:t>05/04/2017</a:t>
+              <a:t>25/04/2017</a:t>
             </a:fld>
             <a:endParaRPr lang="fr-FR"/>
           </a:p>
@@ -900,7 +900,7 @@
           <a:p>
             <a:fld id="{95A67E3B-D062-4AFC-ACCE-50FD5F000C57}" type="datetimeFigureOut">
               <a:rPr lang="fr-FR" smtClean="0"/>
-              <a:t>05/04/2017</a:t>
+              <a:t>25/04/2017</a:t>
             </a:fld>
             <a:endParaRPr lang="fr-FR"/>
           </a:p>
@@ -990,8 +990,8 @@
         </p:nvSpPr>
         <p:spPr>
           <a:xfrm>
-            <a:off x="12796297" y="198362"/>
-            <a:ext cx="3971439" cy="4234072"/>
+            <a:off x="12796301" y="243692"/>
+            <a:ext cx="3971439" cy="5201646"/>
           </a:xfrm>
         </p:spPr>
         <p:txBody>
@@ -1018,8 +1018,8 @@
         </p:nvSpPr>
         <p:spPr>
           <a:xfrm>
-            <a:off x="881962" y="198362"/>
-            <a:ext cx="11665309" cy="4234072"/>
+            <a:off x="881966" y="243692"/>
+            <a:ext cx="11665309" cy="5201646"/>
           </a:xfrm>
         </p:spPr>
         <p:txBody>
@@ -1080,7 +1080,7 @@
           <a:p>
             <a:fld id="{95A67E3B-D062-4AFC-ACCE-50FD5F000C57}" type="datetimeFigureOut">
               <a:rPr lang="fr-FR" smtClean="0"/>
-              <a:t>05/04/2017</a:t>
+              <a:t>25/04/2017</a:t>
             </a:fld>
             <a:endParaRPr lang="fr-FR"/>
           </a:p>
@@ -1250,7 +1250,7 @@
           <a:p>
             <a:fld id="{95A67E3B-D062-4AFC-ACCE-50FD5F000C57}" type="datetimeFigureOut">
               <a:rPr lang="fr-FR" smtClean="0"/>
-              <a:t>05/04/2017</a:t>
+              <a:t>25/04/2017</a:t>
             </a:fld>
             <a:endParaRPr lang="fr-FR"/>
           </a:p>
@@ -1340,8 +1340,8 @@
         </p:nvSpPr>
         <p:spPr>
           <a:xfrm>
-            <a:off x="1180279" y="4048841"/>
-            <a:ext cx="12700315" cy="1251406"/>
+            <a:off x="1180283" y="4974087"/>
+            <a:ext cx="12700315" cy="1537377"/>
           </a:xfrm>
         </p:spPr>
         <p:txBody>
@@ -1372,8 +1372,8 @@
         </p:nvSpPr>
         <p:spPr>
           <a:xfrm>
-            <a:off x="1180279" y="2670544"/>
-            <a:ext cx="12700315" cy="1378297"/>
+            <a:off x="1180283" y="3280821"/>
+            <a:ext cx="12700315" cy="1693267"/>
           </a:xfrm>
         </p:spPr>
         <p:txBody>
@@ -1496,7 +1496,7 @@
           <a:p>
             <a:fld id="{95A67E3B-D062-4AFC-ACCE-50FD5F000C57}" type="datetimeFigureOut">
               <a:rPr lang="fr-FR" smtClean="0"/>
-              <a:t>05/04/2017</a:t>
+              <a:t>25/04/2017</a:t>
             </a:fld>
             <a:endParaRPr lang="fr-FR"/>
           </a:p>
@@ -1609,8 +1609,8 @@
         </p:nvSpPr>
         <p:spPr>
           <a:xfrm>
-            <a:off x="881971" y="1158062"/>
-            <a:ext cx="7818374" cy="3274368"/>
+            <a:off x="881971" y="1422704"/>
+            <a:ext cx="7818374" cy="4022630"/>
           </a:xfrm>
         </p:spPr>
         <p:txBody>
@@ -1694,8 +1694,8 @@
         </p:nvSpPr>
         <p:spPr>
           <a:xfrm>
-            <a:off x="8949372" y="1158062"/>
-            <a:ext cx="7818374" cy="3274368"/>
+            <a:off x="8949372" y="1422704"/>
+            <a:ext cx="7818374" cy="4022630"/>
           </a:xfrm>
         </p:spPr>
         <p:txBody>
@@ -1784,7 +1784,7 @@
           <a:p>
             <a:fld id="{95A67E3B-D062-4AFC-ACCE-50FD5F000C57}" type="datetimeFigureOut">
               <a:rPr lang="fr-FR" smtClean="0"/>
-              <a:t>05/04/2017</a:t>
+              <a:t>25/04/2017</a:t>
             </a:fld>
             <a:endParaRPr lang="fr-FR"/>
           </a:p>
@@ -1874,8 +1874,8 @@
         </p:nvSpPr>
         <p:spPr>
           <a:xfrm>
-            <a:off x="747079" y="252324"/>
-            <a:ext cx="13447393" cy="1050132"/>
+            <a:off x="747083" y="309986"/>
+            <a:ext cx="13447393" cy="1290108"/>
           </a:xfrm>
         </p:spPr>
         <p:txBody>
@@ -1906,8 +1906,8 @@
         </p:nvSpPr>
         <p:spPr>
           <a:xfrm>
-            <a:off x="747092" y="1410389"/>
-            <a:ext cx="6601774" cy="587782"/>
+            <a:off x="747092" y="1732692"/>
+            <a:ext cx="6601774" cy="722103"/>
           </a:xfrm>
         </p:spPr>
         <p:txBody>
@@ -1971,8 +1971,8 @@
         </p:nvSpPr>
         <p:spPr>
           <a:xfrm>
-            <a:off x="747092" y="1998167"/>
-            <a:ext cx="6601774" cy="3630246"/>
+            <a:off x="747092" y="2454792"/>
+            <a:ext cx="6601774" cy="4459833"/>
           </a:xfrm>
         </p:spPr>
         <p:txBody>
@@ -2056,8 +2056,8 @@
         </p:nvSpPr>
         <p:spPr>
           <a:xfrm>
-            <a:off x="7590103" y="1410389"/>
-            <a:ext cx="6604374" cy="587782"/>
+            <a:off x="7590103" y="1732692"/>
+            <a:ext cx="6604374" cy="722103"/>
           </a:xfrm>
         </p:spPr>
         <p:txBody>
@@ -2121,8 +2121,8 @@
         </p:nvSpPr>
         <p:spPr>
           <a:xfrm>
-            <a:off x="7590103" y="1998167"/>
-            <a:ext cx="6604374" cy="3630246"/>
+            <a:off x="7590103" y="2454792"/>
+            <a:ext cx="6604374" cy="4459833"/>
           </a:xfrm>
         </p:spPr>
         <p:txBody>
@@ -2211,7 +2211,7 @@
           <a:p>
             <a:fld id="{95A67E3B-D062-4AFC-ACCE-50FD5F000C57}" type="datetimeFigureOut">
               <a:rPr lang="fr-FR" smtClean="0"/>
-              <a:t>05/04/2017</a:t>
+              <a:t>25/04/2017</a:t>
             </a:fld>
             <a:endParaRPr lang="fr-FR"/>
           </a:p>
@@ -2329,7 +2329,7 @@
           <a:p>
             <a:fld id="{95A67E3B-D062-4AFC-ACCE-50FD5F000C57}" type="datetimeFigureOut">
               <a:rPr lang="fr-FR" smtClean="0"/>
-              <a:t>05/04/2017</a:t>
+              <a:t>25/04/2017</a:t>
             </a:fld>
             <a:endParaRPr lang="fr-FR"/>
           </a:p>
@@ -2424,7 +2424,7 @@
           <a:p>
             <a:fld id="{95A67E3B-D062-4AFC-ACCE-50FD5F000C57}" type="datetimeFigureOut">
               <a:rPr lang="fr-FR" smtClean="0"/>
-              <a:t>05/04/2017</a:t>
+              <a:t>25/04/2017</a:t>
             </a:fld>
             <a:endParaRPr lang="fr-FR"/>
           </a:p>
@@ -2514,8 +2514,8 @@
         </p:nvSpPr>
         <p:spPr>
           <a:xfrm>
-            <a:off x="747083" y="250873"/>
-            <a:ext cx="4915671" cy="1067633"/>
+            <a:off x="747087" y="308204"/>
+            <a:ext cx="4915671" cy="1311610"/>
           </a:xfrm>
         </p:spPr>
         <p:txBody>
@@ -2546,8 +2546,8 @@
         </p:nvSpPr>
         <p:spPr>
           <a:xfrm>
-            <a:off x="5841740" y="250870"/>
-            <a:ext cx="8352737" cy="5377548"/>
+            <a:off x="5841744" y="308198"/>
+            <a:ext cx="8352737" cy="6606431"/>
           </a:xfrm>
         </p:spPr>
         <p:txBody>
@@ -2631,8 +2631,8 @@
         </p:nvSpPr>
         <p:spPr>
           <a:xfrm>
-            <a:off x="747083" y="1318499"/>
-            <a:ext cx="4915671" cy="4309914"/>
+            <a:off x="747087" y="1619803"/>
+            <a:ext cx="4915671" cy="5294820"/>
           </a:xfrm>
         </p:spPr>
         <p:txBody>
@@ -2701,7 +2701,7 @@
           <a:p>
             <a:fld id="{95A67E3B-D062-4AFC-ACCE-50FD5F000C57}" type="datetimeFigureOut">
               <a:rPr lang="fr-FR" smtClean="0"/>
-              <a:t>05/04/2017</a:t>
+              <a:t>25/04/2017</a:t>
             </a:fld>
             <a:endParaRPr lang="fr-FR"/>
           </a:p>
@@ -2791,8 +2791,8 @@
         </p:nvSpPr>
         <p:spPr>
           <a:xfrm>
-            <a:off x="2928656" y="4410553"/>
-            <a:ext cx="8964932" cy="520690"/>
+            <a:off x="2928656" y="5418458"/>
+            <a:ext cx="8964932" cy="639677"/>
           </a:xfrm>
         </p:spPr>
         <p:txBody>
@@ -2823,8 +2823,8 @@
         </p:nvSpPr>
         <p:spPr>
           <a:xfrm>
-            <a:off x="2928656" y="562993"/>
-            <a:ext cx="8964932" cy="3780473"/>
+            <a:off x="2928656" y="691652"/>
+            <a:ext cx="8964932" cy="4644390"/>
           </a:xfrm>
         </p:spPr>
         <p:txBody>
@@ -2884,8 +2884,8 @@
         </p:nvSpPr>
         <p:spPr>
           <a:xfrm>
-            <a:off x="2928656" y="4931248"/>
-            <a:ext cx="8964932" cy="739467"/>
+            <a:off x="2928656" y="6058142"/>
+            <a:ext cx="8964932" cy="908452"/>
           </a:xfrm>
         </p:spPr>
         <p:txBody>
@@ -2954,7 +2954,7 @@
           <a:p>
             <a:fld id="{95A67E3B-D062-4AFC-ACCE-50FD5F000C57}" type="datetimeFigureOut">
               <a:rPr lang="fr-FR" smtClean="0"/>
-              <a:t>05/04/2017</a:t>
+              <a:t>25/04/2017</a:t>
             </a:fld>
             <a:endParaRPr lang="fr-FR"/>
           </a:p>
@@ -3049,8 +3049,8 @@
         </p:nvSpPr>
         <p:spPr>
           <a:xfrm>
-            <a:off x="747079" y="252324"/>
-            <a:ext cx="13447393" cy="1050132"/>
+            <a:off x="747083" y="309986"/>
+            <a:ext cx="13447393" cy="1290108"/>
           </a:xfrm>
           <a:prstGeom prst="rect">
             <a:avLst/>
@@ -3082,8 +3082,8 @@
         </p:nvSpPr>
         <p:spPr>
           <a:xfrm>
-            <a:off x="747079" y="1470193"/>
-            <a:ext cx="13447393" cy="4158229"/>
+            <a:off x="747083" y="1806165"/>
+            <a:ext cx="13447393" cy="5108472"/>
           </a:xfrm>
           <a:prstGeom prst="rect">
             <a:avLst/>
@@ -3144,8 +3144,8 @@
         </p:nvSpPr>
         <p:spPr>
           <a:xfrm>
-            <a:off x="747079" y="5839902"/>
-            <a:ext cx="3486366" cy="335459"/>
+            <a:off x="747079" y="7174443"/>
+            <a:ext cx="3486366" cy="412119"/>
           </a:xfrm>
           <a:prstGeom prst="rect">
             <a:avLst/>
@@ -3167,7 +3167,7 @@
           <a:p>
             <a:fld id="{95A67E3B-D062-4AFC-ACCE-50FD5F000C57}" type="datetimeFigureOut">
               <a:rPr lang="fr-FR" smtClean="0"/>
-              <a:t>05/04/2017</a:t>
+              <a:t>25/04/2017</a:t>
             </a:fld>
             <a:endParaRPr lang="fr-FR"/>
           </a:p>
@@ -3185,8 +3185,8 @@
         </p:nvSpPr>
         <p:spPr>
           <a:xfrm>
-            <a:off x="5105041" y="5839902"/>
-            <a:ext cx="4731488" cy="335459"/>
+            <a:off x="5105041" y="7174443"/>
+            <a:ext cx="4731488" cy="412119"/>
           </a:xfrm>
           <a:prstGeom prst="rect">
             <a:avLst/>
@@ -3222,8 +3222,8 @@
         </p:nvSpPr>
         <p:spPr>
           <a:xfrm>
-            <a:off x="10708115" y="5839902"/>
-            <a:ext cx="3486366" cy="335459"/>
+            <a:off x="10708115" y="7174443"/>
+            <a:ext cx="3486366" cy="412119"/>
           </a:xfrm>
           <a:prstGeom prst="rect">
             <a:avLst/>
@@ -3544,7 +3544,7 @@
       </p:grpSpPr>
       <p:pic>
         <p:nvPicPr>
-          <p:cNvPr id="89" name="Picture 7"/>
+          <p:cNvPr id="63" name="Picture 5"/>
           <p:cNvPicPr>
             <a:picLocks noChangeAspect="1" noChangeArrowheads="1"/>
           </p:cNvPicPr>
@@ -3565,8 +3565,8 @@
         </p:blipFill>
         <p:spPr bwMode="auto">
           <a:xfrm>
-            <a:off x="288000" y="51138"/>
-            <a:ext cx="9532800" cy="3416911"/>
+            <a:off x="10329763" y="1561727"/>
+            <a:ext cx="4163758" cy="6156000"/>
           </a:xfrm>
           <a:prstGeom prst="rect">
             <a:avLst/>
@@ -3608,14 +3608,78 @@
       </p:pic>
       <p:pic>
         <p:nvPicPr>
-          <p:cNvPr id="90" name="Picture 10"/>
+          <p:cNvPr id="64" name="Picture 3"/>
+          <p:cNvPicPr>
+            <a:picLocks noChangeAspect="1" noChangeArrowheads="1"/>
+          </p:cNvPicPr>
+          <p:nvPr/>
+        </p:nvPicPr>
+        <p:blipFill>
+          <a:blip r:embed="rId4">
+            <a:extLst>
+              <a:ext uri="{28A0092B-C50C-407E-A947-70E740481C1C}">
+                <a14:useLocalDpi xmlns:a14="http://schemas.microsoft.com/office/drawing/2010/main" val="0"/>
+              </a:ext>
+            </a:extLst>
+          </a:blip>
+          <a:srcRect/>
+          <a:stretch>
+            <a:fillRect/>
+          </a:stretch>
+        </p:blipFill>
+        <p:spPr bwMode="auto">
+          <a:xfrm>
+            <a:off x="288000" y="50400"/>
+            <a:ext cx="9532800" cy="5115856"/>
+          </a:xfrm>
+          <a:prstGeom prst="rect">
+            <a:avLst/>
+          </a:prstGeom>
+          <a:noFill/>
+          <a:ln>
+            <a:noFill/>
+          </a:ln>
+          <a:effectLst/>
+          <a:extLst>
+            <a:ext uri="{909E8E84-426E-40DD-AFC4-6F175D3DCCD1}">
+              <a14:hiddenFill xmlns:a14="http://schemas.microsoft.com/office/drawing/2010/main">
+                <a:solidFill>
+                  <a:schemeClr val="accent1"/>
+                </a:solidFill>
+              </a14:hiddenFill>
+            </a:ext>
+            <a:ext uri="{91240B29-F687-4F45-9708-019B960494DF}">
+              <a14:hiddenLine xmlns:a14="http://schemas.microsoft.com/office/drawing/2010/main" w="9525">
+                <a:solidFill>
+                  <a:schemeClr val="tx1"/>
+                </a:solidFill>
+                <a:miter lim="800000"/>
+                <a:headEnd/>
+                <a:tailEnd/>
+              </a14:hiddenLine>
+            </a:ext>
+            <a:ext uri="{AF507438-7753-43E0-B8FC-AC1667EBCBE1}">
+              <a14:hiddenEffects xmlns:a14="http://schemas.microsoft.com/office/drawing/2010/main">
+                <a:effectLst>
+                  <a:outerShdw dist="35921" dir="2700000" algn="ctr" rotWithShape="0">
+                    <a:schemeClr val="bg2"/>
+                  </a:outerShdw>
+                </a:effectLst>
+              </a14:hiddenEffects>
+            </a:ext>
+          </a:extLst>
+        </p:spPr>
+      </p:pic>
+      <p:pic>
+        <p:nvPicPr>
+          <p:cNvPr id="65" name="Picture 10"/>
           <p:cNvPicPr>
             <a:picLocks noChangeAspect="1" noChangeArrowheads="1"/>
           </p:cNvPicPr>
           <p:nvPr/>
         </p:nvPicPr>
         <p:blipFill rotWithShape="1">
-          <a:blip r:embed="rId4">
+          <a:blip r:embed="rId5">
             <a:extLst>
               <a:ext uri="{28A0092B-C50C-407E-A947-70E740481C1C}">
                 <a14:useLocalDpi xmlns:a14="http://schemas.microsoft.com/office/drawing/2010/main" val="0"/>
@@ -3627,7 +3691,7 @@
         </p:blipFill>
         <p:spPr bwMode="auto">
           <a:xfrm>
-            <a:off x="9581628" y="18907"/>
+            <a:off x="9581628" y="54050"/>
             <a:ext cx="5450136" cy="1688771"/>
           </a:xfrm>
           <a:prstGeom prst="rect">
@@ -3670,14 +3734,14 @@
       </p:pic>
       <p:pic>
         <p:nvPicPr>
-          <p:cNvPr id="91" name="Picture 3"/>
+          <p:cNvPr id="66" name="Picture 3"/>
           <p:cNvPicPr>
             <a:picLocks noChangeAspect="1" noChangeArrowheads="1"/>
           </p:cNvPicPr>
           <p:nvPr/>
         </p:nvPicPr>
         <p:blipFill>
-          <a:blip r:embed="rId5">
+          <a:blip r:embed="rId6">
             <a:extLst>
               <a:ext uri="{28A0092B-C50C-407E-A947-70E740481C1C}">
                 <a14:useLocalDpi xmlns:a14="http://schemas.microsoft.com/office/drawing/2010/main" val="0"/>
@@ -3691,7 +3755,7 @@
         </p:blipFill>
         <p:spPr bwMode="auto">
           <a:xfrm>
-            <a:off x="4428902" y="3744738"/>
+            <a:off x="4428902" y="5259512"/>
             <a:ext cx="5408613" cy="2500313"/>
           </a:xfrm>
           <a:prstGeom prst="rect">
@@ -3734,14 +3798,14 @@
       </p:pic>
       <p:pic>
         <p:nvPicPr>
-          <p:cNvPr id="92" name="Picture 2"/>
+          <p:cNvPr id="67" name="Picture 2"/>
           <p:cNvPicPr>
             <a:picLocks noChangeAspect="1" noChangeArrowheads="1"/>
           </p:cNvPicPr>
           <p:nvPr/>
         </p:nvPicPr>
         <p:blipFill rotWithShape="1">
-          <a:blip r:embed="rId6">
+          <a:blip r:embed="rId7">
             <a:extLst>
               <a:ext uri="{28A0092B-C50C-407E-A947-70E740481C1C}">
                 <a14:useLocalDpi xmlns:a14="http://schemas.microsoft.com/office/drawing/2010/main" val="0"/>
@@ -3753,7 +3817,7 @@
         </p:blipFill>
         <p:spPr bwMode="auto">
           <a:xfrm>
-            <a:off x="-107999" y="3744738"/>
+            <a:off x="-107999" y="5259512"/>
             <a:ext cx="5328990" cy="2502000"/>
           </a:xfrm>
           <a:prstGeom prst="rect">
@@ -3796,7 +3860,7 @@
       </p:pic>
       <p:sp>
         <p:nvSpPr>
-          <p:cNvPr id="93" name="ZoneTexte 92"/>
+          <p:cNvPr id="68" name="ZoneTexte 67"/>
           <p:cNvSpPr txBox="1"/>
           <p:nvPr/>
         </p:nvSpPr>
@@ -3832,13 +3896,13 @@
       </p:sp>
       <p:sp>
         <p:nvSpPr>
-          <p:cNvPr id="94" name="ZoneTexte 93"/>
+          <p:cNvPr id="69" name="ZoneTexte 68"/>
           <p:cNvSpPr txBox="1"/>
           <p:nvPr/>
         </p:nvSpPr>
         <p:spPr>
           <a:xfrm>
-            <a:off x="288032" y="3579836"/>
+            <a:off x="288032" y="5094610"/>
             <a:ext cx="482824" cy="400110"/>
           </a:xfrm>
           <a:prstGeom prst="rect">
@@ -3868,13 +3932,13 @@
       </p:sp>
       <p:sp>
         <p:nvSpPr>
-          <p:cNvPr id="95" name="ZoneTexte 94"/>
+          <p:cNvPr id="70" name="ZoneTexte 69"/>
           <p:cNvSpPr txBox="1"/>
           <p:nvPr/>
         </p:nvSpPr>
         <p:spPr>
           <a:xfrm>
-            <a:off x="4810174" y="3579886"/>
+            <a:off x="4810174" y="5094660"/>
             <a:ext cx="468398" cy="400110"/>
           </a:xfrm>
           <a:prstGeom prst="rect">
@@ -3904,7 +3968,7 @@
       </p:sp>
       <p:sp>
         <p:nvSpPr>
-          <p:cNvPr id="96" name="ZoneTexte 95"/>
+          <p:cNvPr id="71" name="ZoneTexte 70"/>
           <p:cNvSpPr txBox="1"/>
           <p:nvPr/>
         </p:nvSpPr>
@@ -3938,189 +4002,112 @@
           </a:p>
         </p:txBody>
       </p:sp>
-      <p:grpSp>
-        <p:nvGrpSpPr>
-          <p:cNvPr id="13" name="Groupe 12"/>
-          <p:cNvGrpSpPr/>
+      <p:sp>
+        <p:nvSpPr>
+          <p:cNvPr id="72" name="Rectangle 71"/>
+          <p:cNvSpPr/>
           <p:nvPr/>
-        </p:nvGrpSpPr>
-        <p:grpSpPr>
+        </p:nvSpPr>
+        <p:spPr>
           <a:xfrm>
-            <a:off x="10677053" y="1759593"/>
-            <a:ext cx="3346450" cy="4458619"/>
-            <a:chOff x="10677053" y="1759593"/>
-            <a:chExt cx="3346450" cy="4458619"/>
+            <a:off x="10724400" y="5563401"/>
+            <a:ext cx="144016" cy="236860"/>
           </a:xfrm>
-        </p:grpSpPr>
-        <p:pic>
-          <p:nvPicPr>
-            <p:cNvPr id="99" name="Picture 12"/>
-            <p:cNvPicPr>
-              <a:picLocks noChangeAspect="1" noChangeArrowheads="1"/>
-            </p:cNvPicPr>
-            <p:nvPr/>
-          </p:nvPicPr>
-          <p:blipFill rotWithShape="1">
-            <a:blip r:embed="rId7">
-              <a:extLst>
-                <a:ext uri="{28A0092B-C50C-407E-A947-70E740481C1C}">
-                  <a14:useLocalDpi xmlns:a14="http://schemas.microsoft.com/office/drawing/2010/main" val="0"/>
-                </a:ext>
-              </a:extLst>
-            </a:blip>
-            <a:srcRect t="4210"/>
-            <a:stretch/>
-          </p:blipFill>
-          <p:spPr bwMode="auto">
-            <a:xfrm>
-              <a:off x="10677053" y="1759593"/>
-              <a:ext cx="3346450" cy="4458619"/>
-            </a:xfrm>
-            <a:prstGeom prst="rect">
-              <a:avLst/>
-            </a:prstGeom>
-            <a:noFill/>
-            <a:ln>
-              <a:noFill/>
-            </a:ln>
-            <a:effectLst/>
-            <a:extLst>
-              <a:ext uri="{909E8E84-426E-40DD-AFC4-6F175D3DCCD1}">
-                <a14:hiddenFill xmlns:a14="http://schemas.microsoft.com/office/drawing/2010/main">
-                  <a:solidFill>
-                    <a:schemeClr val="accent1"/>
-                  </a:solidFill>
-                </a14:hiddenFill>
-              </a:ext>
-              <a:ext uri="{91240B29-F687-4F45-9708-019B960494DF}">
-                <a14:hiddenLine xmlns:a14="http://schemas.microsoft.com/office/drawing/2010/main" w="9525">
-                  <a:solidFill>
-                    <a:schemeClr val="tx1"/>
-                  </a:solidFill>
-                  <a:miter lim="800000"/>
-                  <a:headEnd/>
-                  <a:tailEnd/>
-                </a14:hiddenLine>
-              </a:ext>
-              <a:ext uri="{AF507438-7753-43E0-B8FC-AC1667EBCBE1}">
-                <a14:hiddenEffects xmlns:a14="http://schemas.microsoft.com/office/drawing/2010/main">
-                  <a:effectLst>
-                    <a:outerShdw dist="35921" dir="2700000" algn="ctr" rotWithShape="0">
-                      <a:schemeClr val="bg2"/>
-                    </a:outerShdw>
-                  </a:effectLst>
-                </a14:hiddenEffects>
-              </a:ext>
-            </a:extLst>
-          </p:spPr>
-        </p:pic>
-        <p:sp>
-          <p:nvSpPr>
-            <p:cNvPr id="97" name="Rectangle 96"/>
-            <p:cNvSpPr/>
-            <p:nvPr/>
-          </p:nvSpPr>
-          <p:spPr>
-            <a:xfrm>
-              <a:off x="11070008" y="4495154"/>
-              <a:ext cx="144016" cy="236860"/>
-            </a:xfrm>
-            <a:prstGeom prst="rect">
-              <a:avLst/>
-            </a:prstGeom>
+          <a:prstGeom prst="rect">
+            <a:avLst/>
+          </a:prstGeom>
+          <a:solidFill>
+            <a:schemeClr val="bg1"/>
+          </a:solidFill>
+          <a:ln>
             <a:solidFill>
               <a:schemeClr val="bg1"/>
             </a:solidFill>
-            <a:ln>
-              <a:solidFill>
-                <a:schemeClr val="bg1"/>
-              </a:solidFill>
-            </a:ln>
-          </p:spPr>
-          <p:style>
-            <a:lnRef idx="2">
-              <a:schemeClr val="accent1">
-                <a:shade val="50000"/>
-              </a:schemeClr>
-            </a:lnRef>
-            <a:fillRef idx="1">
-              <a:schemeClr val="accent1"/>
-            </a:fillRef>
-            <a:effectRef idx="0">
-              <a:schemeClr val="accent1"/>
-            </a:effectRef>
-            <a:fontRef idx="minor">
-              <a:schemeClr val="lt1"/>
-            </a:fontRef>
-          </p:style>
-          <p:txBody>
-            <a:bodyPr rtlCol="0" anchor="ctr"/>
-            <a:lstStyle/>
-            <a:p>
-              <a:pPr algn="ctr"/>
-              <a:endParaRPr lang="fr-FR"/>
-            </a:p>
-          </p:txBody>
-        </p:sp>
-        <p:sp>
-          <p:nvSpPr>
-            <p:cNvPr id="98" name="Rectangle 97"/>
-            <p:cNvSpPr/>
-            <p:nvPr/>
-          </p:nvSpPr>
-          <p:spPr>
-            <a:xfrm>
-              <a:off x="10981308" y="5405672"/>
-              <a:ext cx="144016" cy="236860"/>
-            </a:xfrm>
-            <a:prstGeom prst="rect">
-              <a:avLst/>
-            </a:prstGeom>
+          </a:ln>
+        </p:spPr>
+        <p:style>
+          <a:lnRef idx="2">
+            <a:schemeClr val="accent1">
+              <a:shade val="50000"/>
+            </a:schemeClr>
+          </a:lnRef>
+          <a:fillRef idx="1">
+            <a:schemeClr val="accent1"/>
+          </a:fillRef>
+          <a:effectRef idx="0">
+            <a:schemeClr val="accent1"/>
+          </a:effectRef>
+          <a:fontRef idx="minor">
+            <a:schemeClr val="lt1"/>
+          </a:fontRef>
+        </p:style>
+        <p:txBody>
+          <a:bodyPr rtlCol="0" anchor="ctr"/>
+          <a:lstStyle/>
+          <a:p>
+            <a:pPr algn="ctr"/>
+            <a:endParaRPr lang="fr-FR"/>
+          </a:p>
+        </p:txBody>
+      </p:sp>
+      <p:sp>
+        <p:nvSpPr>
+          <p:cNvPr id="73" name="Rectangle 72"/>
+          <p:cNvSpPr/>
+          <p:nvPr/>
+        </p:nvSpPr>
+        <p:spPr>
+          <a:xfrm>
+            <a:off x="10639127" y="6822802"/>
+            <a:ext cx="144016" cy="236860"/>
+          </a:xfrm>
+          <a:prstGeom prst="rect">
+            <a:avLst/>
+          </a:prstGeom>
+          <a:solidFill>
+            <a:schemeClr val="bg1"/>
+          </a:solidFill>
+          <a:ln>
             <a:solidFill>
               <a:schemeClr val="bg1"/>
             </a:solidFill>
-            <a:ln>
-              <a:solidFill>
-                <a:schemeClr val="bg1"/>
-              </a:solidFill>
-            </a:ln>
-          </p:spPr>
-          <p:style>
-            <a:lnRef idx="2">
-              <a:schemeClr val="accent1">
-                <a:shade val="50000"/>
-              </a:schemeClr>
-            </a:lnRef>
-            <a:fillRef idx="1">
-              <a:schemeClr val="accent1"/>
-            </a:fillRef>
-            <a:effectRef idx="0">
-              <a:schemeClr val="accent1"/>
-            </a:effectRef>
-            <a:fontRef idx="minor">
-              <a:schemeClr val="lt1"/>
-            </a:fontRef>
-          </p:style>
-          <p:txBody>
-            <a:bodyPr rtlCol="0" anchor="ctr"/>
-            <a:lstStyle/>
-            <a:p>
-              <a:pPr algn="ctr"/>
-              <a:endParaRPr lang="fr-FR"/>
-            </a:p>
-          </p:txBody>
-        </p:sp>
-      </p:grpSp>
-      <p:sp>
-        <p:nvSpPr>
-          <p:cNvPr id="14" name="Rectangle 13"/>
+          </a:ln>
+        </p:spPr>
+        <p:style>
+          <a:lnRef idx="2">
+            <a:schemeClr val="accent1">
+              <a:shade val="50000"/>
+            </a:schemeClr>
+          </a:lnRef>
+          <a:fillRef idx="1">
+            <a:schemeClr val="accent1"/>
+          </a:fillRef>
+          <a:effectRef idx="0">
+            <a:schemeClr val="accent1"/>
+          </a:effectRef>
+          <a:fontRef idx="minor">
+            <a:schemeClr val="lt1"/>
+          </a:fontRef>
+        </p:style>
+        <p:txBody>
+          <a:bodyPr rtlCol="0" anchor="ctr"/>
+          <a:lstStyle/>
+          <a:p>
+            <a:pPr algn="ctr"/>
+            <a:endParaRPr lang="fr-FR"/>
+          </a:p>
+        </p:txBody>
+      </p:sp>
+      <p:sp>
+        <p:nvSpPr>
+          <p:cNvPr id="74" name="Rectangle 73"/>
           <p:cNvSpPr/>
           <p:nvPr/>
         </p:nvSpPr>
         <p:spPr>
           <a:xfrm>
-            <a:off x="11503223" y="1807200"/>
-            <a:ext cx="1296144" cy="720000"/>
+            <a:off x="11214024" y="1782093"/>
+            <a:ext cx="1585343" cy="1080120"/>
           </a:xfrm>
           <a:prstGeom prst="rect">
             <a:avLst/>
@@ -4154,14 +4141,14 @@
       </p:sp>
       <p:cxnSp>
         <p:nvCxnSpPr>
-          <p:cNvPr id="16" name="Connecteur droit 15"/>
+          <p:cNvPr id="75" name="Connecteur droit 74"/>
           <p:cNvCxnSpPr/>
           <p:nvPr/>
         </p:nvCxnSpPr>
         <p:spPr>
           <a:xfrm flipH="1" flipV="1">
-            <a:off x="10135071" y="1134170"/>
-            <a:ext cx="1368152" cy="673030"/>
+            <a:off x="10135071" y="1169313"/>
+            <a:ext cx="1078953" cy="612780"/>
           </a:xfrm>
           <a:prstGeom prst="line">
             <a:avLst/>
@@ -4185,14 +4172,14 @@
       </p:cxnSp>
       <p:cxnSp>
         <p:nvCxnSpPr>
-          <p:cNvPr id="100" name="Connecteur droit 99"/>
+          <p:cNvPr id="76" name="Connecteur droit 75"/>
           <p:cNvCxnSpPr/>
           <p:nvPr/>
         </p:nvCxnSpPr>
         <p:spPr>
           <a:xfrm flipV="1">
-            <a:off x="12799367" y="1134170"/>
-            <a:ext cx="1800200" cy="673030"/>
+            <a:off x="12799367" y="1169313"/>
+            <a:ext cx="1800200" cy="612780"/>
           </a:xfrm>
           <a:prstGeom prst="line">
             <a:avLst/>

</xml_diff>

<commit_message>
Chap04: Corrections done, minus 3 pictures
</commit_message>
<xml_diff>
--- a/04-CrMagOpt/Pictures/6peaks.pptx
+++ b/04-CrMagOpt/Pictures/6peaks.pptx
@@ -192,7 +192,7 @@
           <a:p>
             <a:fld id="{71ADB72D-4157-40BD-BB8F-EC580E2842DA}" type="datetimeFigureOut">
               <a:rPr lang="fr-FR" smtClean="0"/>
-              <a:t>19/07/2017</a:t>
+              <a:t>30/10/2017</a:t>
             </a:fld>
             <a:endParaRPr lang="fr-FR"/>
           </a:p>
@@ -730,7 +730,7 @@
           <a:p>
             <a:fld id="{95A67E3B-D062-4AFC-ACCE-50FD5F000C57}" type="datetimeFigureOut">
               <a:rPr lang="fr-FR" smtClean="0"/>
-              <a:t>19/07/2017</a:t>
+              <a:t>30/10/2017</a:t>
             </a:fld>
             <a:endParaRPr lang="fr-FR"/>
           </a:p>
@@ -900,7 +900,7 @@
           <a:p>
             <a:fld id="{95A67E3B-D062-4AFC-ACCE-50FD5F000C57}" type="datetimeFigureOut">
               <a:rPr lang="fr-FR" smtClean="0"/>
-              <a:t>19/07/2017</a:t>
+              <a:t>30/10/2017</a:t>
             </a:fld>
             <a:endParaRPr lang="fr-FR"/>
           </a:p>
@@ -1080,7 +1080,7 @@
           <a:p>
             <a:fld id="{95A67E3B-D062-4AFC-ACCE-50FD5F000C57}" type="datetimeFigureOut">
               <a:rPr lang="fr-FR" smtClean="0"/>
-              <a:t>19/07/2017</a:t>
+              <a:t>30/10/2017</a:t>
             </a:fld>
             <a:endParaRPr lang="fr-FR"/>
           </a:p>
@@ -1250,7 +1250,7 @@
           <a:p>
             <a:fld id="{95A67E3B-D062-4AFC-ACCE-50FD5F000C57}" type="datetimeFigureOut">
               <a:rPr lang="fr-FR" smtClean="0"/>
-              <a:t>19/07/2017</a:t>
+              <a:t>30/10/2017</a:t>
             </a:fld>
             <a:endParaRPr lang="fr-FR"/>
           </a:p>
@@ -1496,7 +1496,7 @@
           <a:p>
             <a:fld id="{95A67E3B-D062-4AFC-ACCE-50FD5F000C57}" type="datetimeFigureOut">
               <a:rPr lang="fr-FR" smtClean="0"/>
-              <a:t>19/07/2017</a:t>
+              <a:t>30/10/2017</a:t>
             </a:fld>
             <a:endParaRPr lang="fr-FR"/>
           </a:p>
@@ -1784,7 +1784,7 @@
           <a:p>
             <a:fld id="{95A67E3B-D062-4AFC-ACCE-50FD5F000C57}" type="datetimeFigureOut">
               <a:rPr lang="fr-FR" smtClean="0"/>
-              <a:t>19/07/2017</a:t>
+              <a:t>30/10/2017</a:t>
             </a:fld>
             <a:endParaRPr lang="fr-FR"/>
           </a:p>
@@ -2211,7 +2211,7 @@
           <a:p>
             <a:fld id="{95A67E3B-D062-4AFC-ACCE-50FD5F000C57}" type="datetimeFigureOut">
               <a:rPr lang="fr-FR" smtClean="0"/>
-              <a:t>19/07/2017</a:t>
+              <a:t>30/10/2017</a:t>
             </a:fld>
             <a:endParaRPr lang="fr-FR"/>
           </a:p>
@@ -2329,7 +2329,7 @@
           <a:p>
             <a:fld id="{95A67E3B-D062-4AFC-ACCE-50FD5F000C57}" type="datetimeFigureOut">
               <a:rPr lang="fr-FR" smtClean="0"/>
-              <a:t>19/07/2017</a:t>
+              <a:t>30/10/2017</a:t>
             </a:fld>
             <a:endParaRPr lang="fr-FR"/>
           </a:p>
@@ -2424,7 +2424,7 @@
           <a:p>
             <a:fld id="{95A67E3B-D062-4AFC-ACCE-50FD5F000C57}" type="datetimeFigureOut">
               <a:rPr lang="fr-FR" smtClean="0"/>
-              <a:t>19/07/2017</a:t>
+              <a:t>30/10/2017</a:t>
             </a:fld>
             <a:endParaRPr lang="fr-FR"/>
           </a:p>
@@ -2701,7 +2701,7 @@
           <a:p>
             <a:fld id="{95A67E3B-D062-4AFC-ACCE-50FD5F000C57}" type="datetimeFigureOut">
               <a:rPr lang="fr-FR" smtClean="0"/>
-              <a:t>19/07/2017</a:t>
+              <a:t>30/10/2017</a:t>
             </a:fld>
             <a:endParaRPr lang="fr-FR"/>
           </a:p>
@@ -2954,7 +2954,7 @@
           <a:p>
             <a:fld id="{95A67E3B-D062-4AFC-ACCE-50FD5F000C57}" type="datetimeFigureOut">
               <a:rPr lang="fr-FR" smtClean="0"/>
-              <a:t>19/07/2017</a:t>
+              <a:t>30/10/2017</a:t>
             </a:fld>
             <a:endParaRPr lang="fr-FR"/>
           </a:p>
@@ -3167,7 +3167,7 @@
           <a:p>
             <a:fld id="{95A67E3B-D062-4AFC-ACCE-50FD5F000C57}" type="datetimeFigureOut">
               <a:rPr lang="fr-FR" smtClean="0"/>
-              <a:t>19/07/2017</a:t>
+              <a:t>30/10/2017</a:t>
             </a:fld>
             <a:endParaRPr lang="fr-FR"/>
           </a:p>
@@ -4283,6 +4283,106 @@
           </a:p>
         </p:txBody>
       </p:sp>
+      <p:sp>
+        <p:nvSpPr>
+          <p:cNvPr id="3" name="ZoneTexte 2"/>
+          <p:cNvSpPr txBox="1"/>
+          <p:nvPr/>
+        </p:nvSpPr>
+        <p:spPr>
+          <a:xfrm>
+            <a:off x="3798367" y="2358157"/>
+            <a:ext cx="864095" cy="369332"/>
+          </a:xfrm>
+          <a:prstGeom prst="rect">
+            <a:avLst/>
+          </a:prstGeom>
+          <a:noFill/>
+        </p:spPr>
+        <p:txBody>
+          <a:bodyPr wrap="square" rtlCol="0">
+            <a:spAutoFit/>
+          </a:bodyPr>
+          <a:lstStyle/>
+          <a:p>
+            <a:r>
+              <a:rPr lang="fr-FR" sz="1800" dirty="0" smtClean="0">
+                <a:latin typeface="Times New Roman" panose="02020603050405020304" pitchFamily="18" charset="0"/>
+                <a:cs typeface="Times New Roman" panose="02020603050405020304" pitchFamily="18" charset="0"/>
+              </a:rPr>
+              <a:t>X</a:t>
+            </a:r>
+            <a:r>
+              <a:rPr lang="fr-FR" sz="1800" baseline="30000" dirty="0" smtClean="0">
+                <a:latin typeface="Times New Roman" panose="02020603050405020304" pitchFamily="18" charset="0"/>
+                <a:cs typeface="Times New Roman" panose="02020603050405020304" pitchFamily="18" charset="0"/>
+              </a:rPr>
+              <a:t>+</a:t>
+            </a:r>
+            <a:r>
+              <a:rPr lang="fr-FR" sz="1800" dirty="0" smtClean="0">
+                <a:latin typeface="Times New Roman" panose="02020603050405020304" pitchFamily="18" charset="0"/>
+                <a:cs typeface="Times New Roman" panose="02020603050405020304" pitchFamily="18" charset="0"/>
+              </a:rPr>
+              <a:t>-Cr</a:t>
+            </a:r>
+            <a:endParaRPr lang="fr-FR" sz="1800" dirty="0">
+              <a:latin typeface="Times New Roman" panose="02020603050405020304" pitchFamily="18" charset="0"/>
+              <a:cs typeface="Times New Roman" panose="02020603050405020304" pitchFamily="18" charset="0"/>
+            </a:endParaRPr>
+          </a:p>
+        </p:txBody>
+      </p:sp>
+      <p:sp>
+        <p:nvSpPr>
+          <p:cNvPr id="19" name="ZoneTexte 18"/>
+          <p:cNvSpPr txBox="1"/>
+          <p:nvPr/>
+        </p:nvSpPr>
+        <p:spPr>
+          <a:xfrm>
+            <a:off x="2286199" y="269925"/>
+            <a:ext cx="864095" cy="369332"/>
+          </a:xfrm>
+          <a:prstGeom prst="rect">
+            <a:avLst/>
+          </a:prstGeom>
+          <a:noFill/>
+        </p:spPr>
+        <p:txBody>
+          <a:bodyPr wrap="square" rtlCol="0">
+            <a:spAutoFit/>
+          </a:bodyPr>
+          <a:lstStyle/>
+          <a:p>
+            <a:r>
+              <a:rPr lang="fr-FR" sz="1800" dirty="0" smtClean="0">
+                <a:latin typeface="Times New Roman" panose="02020603050405020304" pitchFamily="18" charset="0"/>
+                <a:cs typeface="Times New Roman" panose="02020603050405020304" pitchFamily="18" charset="0"/>
+              </a:rPr>
+              <a:t>X</a:t>
+            </a:r>
+            <a:r>
+              <a:rPr lang="fr-FR" sz="1800" baseline="30000" dirty="0" smtClean="0">
+                <a:latin typeface="Times New Roman" panose="02020603050405020304" pitchFamily="18" charset="0"/>
+                <a:cs typeface="Times New Roman" panose="02020603050405020304" pitchFamily="18" charset="0"/>
+              </a:rPr>
+              <a:t>-</a:t>
+            </a:r>
+            <a:r>
+              <a:rPr lang="fr-FR" sz="1800" dirty="0" smtClean="0">
+                <a:latin typeface="Times New Roman" panose="02020603050405020304" pitchFamily="18" charset="0"/>
+                <a:cs typeface="Times New Roman" panose="02020603050405020304" pitchFamily="18" charset="0"/>
+              </a:rPr>
+              <a:t>-Cr</a:t>
+            </a:r>
+            <a:endParaRPr lang="fr-FR" sz="1800" dirty="0">
+              <a:latin typeface="Times New Roman" panose="02020603050405020304" pitchFamily="18" charset="0"/>
+              <a:cs typeface="Times New Roman" panose="02020603050405020304" pitchFamily="18" charset="0"/>
+            </a:endParaRPr>
+          </a:p>
+        </p:txBody>
+      </p:sp>
     </p:spTree>
     <p:extLst>
       <p:ext uri="{BB962C8B-B14F-4D97-AF65-F5344CB8AC3E}">

</xml_diff>